<commit_message>
Update Final_Presentation - Copy.pptx
</commit_message>
<xml_diff>
--- a/presentation/Final_Presentation - Copy.pptx
+++ b/presentation/Final_Presentation - Copy.pptx
@@ -218,7 +218,7 @@
           <a:p>
             <a:fld id="{5233E4E4-8B62-4356-A202-E54336A2C808}" type="datetimeFigureOut">
               <a:rPr lang="de-CH" smtClean="0"/>
-              <a:t>27.06.2021</a:t>
+              <a:t>28.06.2021</a:t>
             </a:fld>
             <a:endParaRPr lang="de-CH"/>
           </a:p>
@@ -296,7 +296,7 @@
           <a:p>
             <a:fld id="{78F261B1-FCA4-4A7D-A3FD-17D05513D3D0}" type="slidenum">
               <a:rPr lang="de-CH" smtClean="0"/>
-              <a:t>‹N›</a:t>
+              <a:t>‹#›</a:t>
             </a:fld>
             <a:endParaRPr lang="de-CH"/>
           </a:p>
@@ -396,7 +396,7 @@
           <a:p>
             <a:fld id="{771077F2-B8AE-4D44-9AB2-A014164F0B23}" type="datetimeFigureOut">
               <a:rPr lang="de-CH" smtClean="0"/>
-              <a:t>27.06.2021</a:t>
+              <a:t>28.06.2021</a:t>
             </a:fld>
             <a:endParaRPr lang="de-CH"/>
           </a:p>
@@ -555,7 +555,7 @@
           <a:p>
             <a:fld id="{CF8F3001-8820-440F-AE2B-9E23CEB8CE24}" type="slidenum">
               <a:rPr lang="de-CH" smtClean="0"/>
-              <a:t>‹N›</a:t>
+              <a:t>‹#›</a:t>
             </a:fld>
             <a:endParaRPr lang="de-CH"/>
           </a:p>
@@ -1656,7 +1656,7 @@
           <a:p>
             <a:fld id="{2122A0B2-C68B-4CFC-AF3E-92977241CFF8}" type="datetime1">
               <a:rPr lang="en-GB" smtClean="0"/>
-              <a:t>27/06/2021</a:t>
+              <a:t>28/06/2021</a:t>
             </a:fld>
             <a:endParaRPr lang="de-CH"/>
           </a:p>
@@ -1713,7 +1713,7 @@
           <a:p>
             <a:fld id="{2FD792E3-E401-4E03-A367-A0CE4F17704C}" type="slidenum">
               <a:rPr lang="de-CH" smtClean="0"/>
-              <a:t>‹N›</a:t>
+              <a:t>‹#›</a:t>
             </a:fld>
             <a:endParaRPr lang="de-CH"/>
           </a:p>
@@ -1859,7 +1859,7 @@
           <a:p>
             <a:fld id="{95D010D2-9FCB-4F37-A210-3A311315C6D6}" type="datetime1">
               <a:rPr lang="en-GB" smtClean="0"/>
-              <a:t>27/06/2021</a:t>
+              <a:t>28/06/2021</a:t>
             </a:fld>
             <a:endParaRPr lang="de-CH"/>
           </a:p>
@@ -1916,7 +1916,7 @@
           <a:p>
             <a:fld id="{2FD792E3-E401-4E03-A367-A0CE4F17704C}" type="slidenum">
               <a:rPr lang="de-CH" smtClean="0"/>
-              <a:t>‹N›</a:t>
+              <a:t>‹#›</a:t>
             </a:fld>
             <a:endParaRPr lang="de-CH"/>
           </a:p>
@@ -2072,7 +2072,7 @@
           <a:p>
             <a:fld id="{DA1A7200-B217-44B0-B993-314DC6EBCCD6}" type="datetime1">
               <a:rPr lang="en-GB" smtClean="0"/>
-              <a:t>27/06/2021</a:t>
+              <a:t>28/06/2021</a:t>
             </a:fld>
             <a:endParaRPr lang="de-CH"/>
           </a:p>
@@ -2129,7 +2129,7 @@
           <a:p>
             <a:fld id="{2FD792E3-E401-4E03-A367-A0CE4F17704C}" type="slidenum">
               <a:rPr lang="de-CH" smtClean="0"/>
-              <a:t>‹N›</a:t>
+              <a:t>‹#›</a:t>
             </a:fld>
             <a:endParaRPr lang="de-CH"/>
           </a:p>
@@ -2275,7 +2275,7 @@
           <a:p>
             <a:fld id="{D34BE53F-357E-42E6-AE8E-DFACCE00A26D}" type="datetime1">
               <a:rPr lang="en-GB" smtClean="0"/>
-              <a:t>27/06/2021</a:t>
+              <a:t>28/06/2021</a:t>
             </a:fld>
             <a:endParaRPr lang="de-CH"/>
           </a:p>
@@ -2332,7 +2332,7 @@
           <a:p>
             <a:fld id="{2FD792E3-E401-4E03-A367-A0CE4F17704C}" type="slidenum">
               <a:rPr lang="de-CH" smtClean="0"/>
-              <a:t>‹N›</a:t>
+              <a:t>‹#›</a:t>
             </a:fld>
             <a:endParaRPr lang="de-CH"/>
           </a:p>
@@ -2554,7 +2554,7 @@
           <a:p>
             <a:fld id="{60F14748-6DFA-4414-8FE2-328A61FE0787}" type="datetime1">
               <a:rPr lang="en-GB" smtClean="0"/>
-              <a:t>27/06/2021</a:t>
+              <a:t>28/06/2021</a:t>
             </a:fld>
             <a:endParaRPr lang="de-CH"/>
           </a:p>
@@ -2611,7 +2611,7 @@
           <a:p>
             <a:fld id="{2FD792E3-E401-4E03-A367-A0CE4F17704C}" type="slidenum">
               <a:rPr lang="de-CH" smtClean="0"/>
-              <a:t>‹N›</a:t>
+              <a:t>‹#›</a:t>
             </a:fld>
             <a:endParaRPr lang="de-CH"/>
           </a:p>
@@ -2825,7 +2825,7 @@
           <a:p>
             <a:fld id="{3A6C4DAA-5200-4E49-97EF-AFAA3787933C}" type="datetime1">
               <a:rPr lang="en-GB" smtClean="0"/>
-              <a:t>27/06/2021</a:t>
+              <a:t>28/06/2021</a:t>
             </a:fld>
             <a:endParaRPr lang="de-CH"/>
           </a:p>
@@ -2882,7 +2882,7 @@
           <a:p>
             <a:fld id="{2FD792E3-E401-4E03-A367-A0CE4F17704C}" type="slidenum">
               <a:rPr lang="de-CH" smtClean="0"/>
-              <a:t>‹N›</a:t>
+              <a:t>‹#›</a:t>
             </a:fld>
             <a:endParaRPr lang="de-CH"/>
           </a:p>
@@ -3243,7 +3243,7 @@
           <a:p>
             <a:fld id="{97412C70-6D58-48C3-AB5B-51B9A5F7A762}" type="datetime1">
               <a:rPr lang="en-GB" smtClean="0"/>
-              <a:t>27/06/2021</a:t>
+              <a:t>28/06/2021</a:t>
             </a:fld>
             <a:endParaRPr lang="de-CH"/>
           </a:p>
@@ -3300,7 +3300,7 @@
           <a:p>
             <a:fld id="{2FD792E3-E401-4E03-A367-A0CE4F17704C}" type="slidenum">
               <a:rPr lang="de-CH" smtClean="0"/>
-              <a:t>‹N›</a:t>
+              <a:t>‹#›</a:t>
             </a:fld>
             <a:endParaRPr lang="de-CH"/>
           </a:p>
@@ -3388,7 +3388,7 @@
           <a:p>
             <a:fld id="{38A65BCC-E555-4E25-90B7-781FDC447933}" type="datetime1">
               <a:rPr lang="en-GB" smtClean="0"/>
-              <a:t>27/06/2021</a:t>
+              <a:t>28/06/2021</a:t>
             </a:fld>
             <a:endParaRPr lang="de-CH"/>
           </a:p>
@@ -3445,7 +3445,7 @@
           <a:p>
             <a:fld id="{2FD792E3-E401-4E03-A367-A0CE4F17704C}" type="slidenum">
               <a:rPr lang="de-CH" smtClean="0"/>
-              <a:t>‹N›</a:t>
+              <a:t>‹#›</a:t>
             </a:fld>
             <a:endParaRPr lang="de-CH"/>
           </a:p>
@@ -3504,7 +3504,7 @@
           <a:p>
             <a:fld id="{9CDE39CB-DD2D-403A-9BCB-482E19A32A92}" type="datetime1">
               <a:rPr lang="en-GB" smtClean="0"/>
-              <a:t>27/06/2021</a:t>
+              <a:t>28/06/2021</a:t>
             </a:fld>
             <a:endParaRPr lang="de-CH"/>
           </a:p>
@@ -3561,7 +3561,7 @@
           <a:p>
             <a:fld id="{2FD792E3-E401-4E03-A367-A0CE4F17704C}" type="slidenum">
               <a:rPr lang="de-CH" smtClean="0"/>
-              <a:t>‹N›</a:t>
+              <a:t>‹#›</a:t>
             </a:fld>
             <a:endParaRPr lang="de-CH"/>
           </a:p>
@@ -3820,7 +3820,7 @@
           <a:p>
             <a:fld id="{30F67639-CCF9-41B9-B413-9F124362649E}" type="datetime1">
               <a:rPr lang="en-GB" smtClean="0"/>
-              <a:t>27/06/2021</a:t>
+              <a:t>28/06/2021</a:t>
             </a:fld>
             <a:endParaRPr lang="de-CH"/>
           </a:p>
@@ -3877,7 +3877,7 @@
           <a:p>
             <a:fld id="{2FD792E3-E401-4E03-A367-A0CE4F17704C}" type="slidenum">
               <a:rPr lang="de-CH" smtClean="0"/>
-              <a:t>‹N›</a:t>
+              <a:t>‹#›</a:t>
             </a:fld>
             <a:endParaRPr lang="de-CH"/>
           </a:p>
@@ -4112,7 +4112,7 @@
           <a:p>
             <a:fld id="{65C79ECD-86AF-436D-9778-5222C52DEF1C}" type="datetime1">
               <a:rPr lang="en-GB" smtClean="0"/>
-              <a:t>27/06/2021</a:t>
+              <a:t>28/06/2021</a:t>
             </a:fld>
             <a:endParaRPr lang="de-CH"/>
           </a:p>
@@ -4169,7 +4169,7 @@
           <a:p>
             <a:fld id="{2FD792E3-E401-4E03-A367-A0CE4F17704C}" type="slidenum">
               <a:rPr lang="de-CH" smtClean="0"/>
-              <a:t>‹N›</a:t>
+              <a:t>‹#›</a:t>
             </a:fld>
             <a:endParaRPr lang="de-CH"/>
           </a:p>
@@ -4358,7 +4358,7 @@
           <a:p>
             <a:fld id="{86D0E6A5-2101-4529-A593-35971253E0E4}" type="datetime1">
               <a:rPr lang="en-GB" smtClean="0"/>
-              <a:t>27/06/2021</a:t>
+              <a:t>28/06/2021</a:t>
             </a:fld>
             <a:endParaRPr lang="de-CH"/>
           </a:p>
@@ -4451,7 +4451,7 @@
           <a:p>
             <a:fld id="{2FD792E3-E401-4E03-A367-A0CE4F17704C}" type="slidenum">
               <a:rPr lang="de-CH" smtClean="0"/>
-              <a:t>‹N›</a:t>
+              <a:t>‹#›</a:t>
             </a:fld>
             <a:endParaRPr lang="de-CH"/>
           </a:p>
@@ -6070,7 +6070,7 @@
           <a:p>
             <a:fld id="{93DF1834-CED1-46D6-BB7B-6C52CF0E4649}" type="datetime1">
               <a:rPr lang="en-GB" smtClean="0"/>
-              <a:t>27/06/2021</a:t>
+              <a:t>28/06/2021</a:t>
             </a:fld>
             <a:endParaRPr lang="de-CH"/>
           </a:p>
@@ -8902,7 +8902,7 @@
           <a:p>
             <a:fld id="{4C3F2C8B-BFDB-4DB2-8412-CD9E36C07FE0}" type="datetime1">
               <a:rPr lang="en-GB" smtClean="0"/>
-              <a:t>27/06/2021</a:t>
+              <a:t>28/06/2021</a:t>
             </a:fld>
             <a:endParaRPr lang="de-CH"/>
           </a:p>
@@ -13281,7 +13281,7 @@
           <a:p>
             <a:fld id="{4C3F2C8B-BFDB-4DB2-8412-CD9E36C07FE0}" type="datetime1">
               <a:rPr lang="en-GB" smtClean="0"/>
-              <a:t>27/06/2021</a:t>
+              <a:t>28/06/2021</a:t>
             </a:fld>
             <a:endParaRPr lang="de-CH"/>
           </a:p>
@@ -19050,7 +19050,7 @@
           <a:p>
             <a:fld id="{603E4F4D-713A-47CD-8511-7FDACD1445BE}" type="datetime1">
               <a:rPr lang="en-GB" smtClean="0"/>
-              <a:t>27/06/2021</a:t>
+              <a:t>28/06/2021</a:t>
             </a:fld>
             <a:endParaRPr lang="de-CH"/>
           </a:p>
@@ -19176,6 +19176,10 @@
           </a:bodyPr>
           <a:lstStyle/>
           <a:p>
+            <a:pPr marL="285750" indent="-285750">
+              <a:buFont typeface="Arial" panose="020B0604020202020204" pitchFamily="34" charset="0"/>
+              <a:buChar char="•"/>
+            </a:pPr>
             <a:r>
               <a:rPr lang="fr-CH" dirty="0" err="1"/>
               <a:t>Comprehensibility</a:t>
@@ -19183,6 +19187,10 @@
             <a:endParaRPr lang="fr-CH" dirty="0"/>
           </a:p>
           <a:p>
+            <a:pPr marL="285750" indent="-285750">
+              <a:buFont typeface="Arial" panose="020B0604020202020204" pitchFamily="34" charset="0"/>
+              <a:buChar char="•"/>
+            </a:pPr>
             <a:r>
               <a:rPr lang="fr-CH" dirty="0" err="1"/>
               <a:t>Reproduciblity</a:t>
@@ -19190,6 +19198,10 @@
             <a:endParaRPr lang="fr-CH" dirty="0"/>
           </a:p>
           <a:p>
+            <a:pPr marL="285750" indent="-285750">
+              <a:buFont typeface="Arial" panose="020B0604020202020204" pitchFamily="34" charset="0"/>
+              <a:buChar char="•"/>
+            </a:pPr>
             <a:r>
               <a:rPr lang="fr-CH" dirty="0" err="1"/>
               <a:t>Feature</a:t>
@@ -19216,7 +19228,7 @@
         <p:spPr>
           <a:xfrm>
             <a:off x="596917" y="3402188"/>
-            <a:ext cx="3441683" cy="2308324"/>
+            <a:ext cx="4012405" cy="2308324"/>
           </a:xfrm>
           <a:prstGeom prst="rect">
             <a:avLst/>
@@ -19229,6 +19241,10 @@
           </a:bodyPr>
           <a:lstStyle/>
           <a:p>
+            <a:pPr marL="342900" indent="-342900">
+              <a:buFont typeface="+mj-lt"/>
+              <a:buAutoNum type="arabicPeriod"/>
+            </a:pPr>
             <a:r>
               <a:rPr lang="fr-CH" dirty="0"/>
               <a:t>Classification </a:t>
@@ -19240,6 +19256,10 @@
             <a:endParaRPr lang="fr-CH" dirty="0"/>
           </a:p>
           <a:p>
+            <a:pPr marL="342900" indent="-342900">
+              <a:buFont typeface="+mj-lt"/>
+              <a:buAutoNum type="arabicPeriod"/>
+            </a:pPr>
             <a:r>
               <a:rPr lang="fr-CH" dirty="0" err="1"/>
               <a:t>Decision</a:t>
@@ -19255,6 +19275,10 @@
             <a:endParaRPr lang="fr-CH" dirty="0"/>
           </a:p>
           <a:p>
+            <a:pPr marL="342900" indent="-342900">
+              <a:buFont typeface="+mj-lt"/>
+              <a:buAutoNum type="arabicPeriod"/>
+            </a:pPr>
             <a:r>
               <a:rPr lang="fr-CH" dirty="0" err="1"/>
               <a:t>Random</a:t>
@@ -19265,6 +19289,10 @@
             </a:r>
           </a:p>
           <a:p>
+            <a:pPr marL="342900" indent="-342900">
+              <a:buFont typeface="+mj-lt"/>
+              <a:buAutoNum type="arabicPeriod"/>
+            </a:pPr>
             <a:r>
               <a:rPr lang="fr-CH" dirty="0"/>
               <a:t>K-</a:t>
@@ -19287,6 +19315,10 @@
             </a:r>
           </a:p>
           <a:p>
+            <a:pPr marL="342900" indent="-342900">
+              <a:buFont typeface="+mj-lt"/>
+              <a:buAutoNum type="arabicPeriod"/>
+            </a:pPr>
             <a:r>
               <a:rPr lang="fr-CH" dirty="0"/>
               <a:t>Support </a:t>
@@ -19301,6 +19333,10 @@
             </a:r>
           </a:p>
           <a:p>
+            <a:pPr marL="342900" indent="-342900">
+              <a:buFont typeface="+mj-lt"/>
+              <a:buAutoNum type="arabicPeriod"/>
+            </a:pPr>
             <a:r>
               <a:rPr lang="fr-CH" dirty="0" err="1"/>
               <a:t>XGBoost</a:t>
@@ -19308,6 +19344,10 @@
             <a:endParaRPr lang="fr-CH" dirty="0"/>
           </a:p>
           <a:p>
+            <a:pPr marL="342900" indent="-342900">
+              <a:buFont typeface="+mj-lt"/>
+              <a:buAutoNum type="arabicPeriod"/>
+            </a:pPr>
             <a:r>
               <a:rPr lang="fr-CH" dirty="0" err="1"/>
               <a:t>AdaBoost</a:t>
@@ -19323,6 +19363,10 @@
             <a:endParaRPr lang="fr-CH" dirty="0"/>
           </a:p>
           <a:p>
+            <a:pPr marL="342900" indent="-342900">
+              <a:buFont typeface="+mj-lt"/>
+              <a:buAutoNum type="arabicPeriod"/>
+            </a:pPr>
             <a:r>
               <a:rPr lang="fr-CH" dirty="0"/>
               <a:t>Multi-Layer Perceptron (MLP)</a:t>
@@ -22080,8 +22124,8 @@
         </p:nvSpPr>
         <p:spPr>
           <a:xfrm>
-            <a:off x="927137" y="2038571"/>
-            <a:ext cx="2320817" cy="3693319"/>
+            <a:off x="1097865" y="2190042"/>
+            <a:ext cx="2743200" cy="3416320"/>
           </a:xfrm>
           <a:prstGeom prst="rect">
             <a:avLst/>
@@ -22094,22 +22138,41 @@
           </a:bodyPr>
           <a:lstStyle/>
           <a:p>
+            <a:pPr marL="285750" indent="-285750">
+              <a:buFont typeface="Arial" panose="020B0604020202020204" pitchFamily="34" charset="0"/>
+              <a:buChar char="•"/>
+            </a:pPr>
             <a:r>
               <a:rPr lang="fr-CH" dirty="0"/>
-              <a:t>Train-test set</a:t>
-            </a:r>
-          </a:p>
-          <a:p>
+              <a:t>Train-test set (.25 .75)</a:t>
+            </a:r>
+          </a:p>
+          <a:p>
+            <a:pPr marL="285750" indent="-285750">
+              <a:buFont typeface="Arial" panose="020B0604020202020204" pitchFamily="34" charset="0"/>
+              <a:buChar char="•"/>
+            </a:pPr>
             <a:r>
               <a:rPr lang="fr-CH" dirty="0" err="1"/>
               <a:t>Stratified</a:t>
             </a:r>
+            <a:r>
+              <a:rPr lang="fr-CH" dirty="0"/>
+              <a:t> split</a:t>
+            </a:r>
+          </a:p>
+          <a:p>
+            <a:pPr marL="285750" indent="-285750">
+              <a:buFont typeface="Arial" panose="020B0604020202020204" pitchFamily="34" charset="0"/>
+              <a:buChar char="•"/>
+            </a:pPr>
             <a:endParaRPr lang="fr-CH" dirty="0"/>
           </a:p>
           <a:p>
-            <a:endParaRPr lang="fr-CH" dirty="0"/>
-          </a:p>
-          <a:p>
+            <a:pPr marL="285750" indent="-285750">
+              <a:buFont typeface="Arial" panose="020B0604020202020204" pitchFamily="34" charset="0"/>
+              <a:buChar char="•"/>
+            </a:pPr>
             <a:r>
               <a:rPr lang="fr-CH" dirty="0" err="1"/>
               <a:t>Grid</a:t>
@@ -22133,12 +22196,20 @@
             <a:endParaRPr lang="fr-CH" dirty="0"/>
           </a:p>
           <a:p>
+            <a:pPr marL="285750" indent="-285750">
+              <a:buFont typeface="Arial" panose="020B0604020202020204" pitchFamily="34" charset="0"/>
+              <a:buChar char="•"/>
+            </a:pPr>
             <a:r>
               <a:rPr lang="fr-CH" dirty="0"/>
               <a:t>Cross-validation</a:t>
             </a:r>
           </a:p>
           <a:p>
+            <a:pPr marL="285750" indent="-285750">
+              <a:buFont typeface="Arial" panose="020B0604020202020204" pitchFamily="34" charset="0"/>
+              <a:buChar char="•"/>
+            </a:pPr>
             <a:endParaRPr lang="fr-CH" dirty="0"/>
           </a:p>
           <a:p>
@@ -22157,12 +22228,20 @@
             <a:endParaRPr lang="fr-CH" dirty="0"/>
           </a:p>
           <a:p>
+            <a:pPr marL="285750" indent="-285750">
+              <a:buFont typeface="Arial" panose="020B0604020202020204" pitchFamily="34" charset="0"/>
+              <a:buChar char="•"/>
+            </a:pPr>
             <a:r>
               <a:rPr lang="fr-CH" dirty="0"/>
               <a:t>F1-Score</a:t>
             </a:r>
           </a:p>
           <a:p>
+            <a:pPr marL="742950" lvl="1" indent="-285750">
+              <a:buFont typeface="Arial" panose="020B0604020202020204" pitchFamily="34" charset="0"/>
+              <a:buChar char="•"/>
+            </a:pPr>
             <a:r>
               <a:rPr lang="fr-CH" dirty="0" err="1"/>
               <a:t>Precision</a:t>
@@ -22170,6 +22249,10 @@
             <a:endParaRPr lang="fr-CH" dirty="0"/>
           </a:p>
           <a:p>
+            <a:pPr marL="742950" lvl="1" indent="-285750">
+              <a:buFont typeface="Arial" panose="020B0604020202020204" pitchFamily="34" charset="0"/>
+              <a:buChar char="•"/>
+            </a:pPr>
             <a:r>
               <a:rPr lang="fr-CH" dirty="0" err="1"/>
               <a:t>Recall</a:t>
@@ -22177,6 +22260,10 @@
             <a:endParaRPr lang="fr-CH" dirty="0"/>
           </a:p>
           <a:p>
+            <a:pPr marL="742950" lvl="1" indent="-285750">
+              <a:buFont typeface="Arial" panose="020B0604020202020204" pitchFamily="34" charset="0"/>
+              <a:buChar char="•"/>
+            </a:pPr>
             <a:r>
               <a:rPr lang="fr-CH" dirty="0" err="1"/>
               <a:t>Harmonic</a:t>
@@ -22192,9 +22279,10 @@
             <a:endParaRPr lang="fr-CH" dirty="0"/>
           </a:p>
           <a:p>
-            <a:endParaRPr lang="fr-CH" dirty="0"/>
-          </a:p>
-          <a:p>
+            <a:pPr marL="285750" indent="-285750">
+              <a:buFont typeface="Arial" panose="020B0604020202020204" pitchFamily="34" charset="0"/>
+              <a:buChar char="•"/>
+            </a:pPr>
             <a:r>
               <a:rPr lang="fr-CH" dirty="0"/>
               <a:t>Macro-F1</a:t>
@@ -22216,8 +22304,8 @@
         </p:nvSpPr>
         <p:spPr>
           <a:xfrm>
-            <a:off x="9321168" y="1704979"/>
-            <a:ext cx="2320817" cy="1200329"/>
+            <a:off x="7847072" y="2178511"/>
+            <a:ext cx="4576043" cy="2031325"/>
           </a:xfrm>
           <a:prstGeom prst="rect">
             <a:avLst/>
@@ -22230,87 +22318,174 @@
           </a:bodyPr>
           <a:lstStyle/>
           <a:p>
+            <a:pPr marL="285750" indent="-285750">
+              <a:buFont typeface="Arial" panose="020B0604020202020204" pitchFamily="34" charset="0"/>
+              <a:buChar char="•"/>
+            </a:pPr>
             <a:r>
               <a:rPr lang="fr-CH" dirty="0"/>
               <a:t>Four Imputation Methods</a:t>
             </a:r>
           </a:p>
           <a:p>
+            <a:pPr marL="742950" lvl="1" indent="-285750">
+              <a:buFont typeface="Arial" panose="020B0604020202020204" pitchFamily="34" charset="0"/>
+              <a:buChar char="•"/>
+            </a:pPr>
+            <a:r>
+              <a:rPr lang="fr-CH" dirty="0" err="1"/>
+              <a:t>OneHotEncoding</a:t>
+            </a:r>
             <a:endParaRPr lang="fr-CH" dirty="0"/>
           </a:p>
           <a:p>
+            <a:pPr marL="742950" lvl="1" indent="-285750">
+              <a:buFont typeface="Arial" panose="020B0604020202020204" pitchFamily="34" charset="0"/>
+              <a:buChar char="•"/>
+            </a:pPr>
+            <a:r>
+              <a:rPr lang="fr-CH" dirty="0"/>
+              <a:t>No </a:t>
+            </a:r>
+            <a:r>
+              <a:rPr lang="fr-CH" dirty="0" err="1"/>
+              <a:t>OneHotEncoding</a:t>
+            </a:r>
+            <a:endParaRPr lang="fr-CH" dirty="0"/>
+          </a:p>
+          <a:p>
+            <a:pPr marL="742950" lvl="1" indent="-285750">
+              <a:buFont typeface="Arial" panose="020B0604020202020204" pitchFamily="34" charset="0"/>
+              <a:buChar char="•"/>
+            </a:pPr>
+            <a:r>
+              <a:rPr lang="fr-CH" dirty="0" err="1"/>
+              <a:t>OneHotEncoding</a:t>
+            </a:r>
+            <a:r>
+              <a:rPr lang="fr-CH" dirty="0"/>
+              <a:t> w/ KNN Imputer</a:t>
+            </a:r>
+          </a:p>
+          <a:p>
+            <a:pPr marL="742950" lvl="1" indent="-285750">
+              <a:buFont typeface="Arial" panose="020B0604020202020204" pitchFamily="34" charset="0"/>
+              <a:buChar char="•"/>
+            </a:pPr>
+            <a:r>
+              <a:rPr lang="fr-CH" dirty="0"/>
+              <a:t>No </a:t>
+            </a:r>
+            <a:r>
+              <a:rPr lang="fr-CH" dirty="0" err="1"/>
+              <a:t>OneHotEncoding</a:t>
+            </a:r>
+            <a:r>
+              <a:rPr lang="fr-CH" dirty="0"/>
+              <a:t> w/ KNN Imputer</a:t>
+            </a:r>
+          </a:p>
+          <a:p>
+            <a:endParaRPr lang="fr-CH" dirty="0"/>
+          </a:p>
+          <a:p>
+            <a:pPr marL="285750" indent="-285750">
+              <a:buFont typeface="Arial" panose="020B0604020202020204" pitchFamily="34" charset="0"/>
+              <a:buChar char="•"/>
+            </a:pPr>
             <a:r>
               <a:rPr lang="fr-CH" dirty="0"/>
               <a:t>712 Relevant </a:t>
             </a:r>
             <a:r>
-              <a:rPr lang="fr-CH"/>
+              <a:rPr lang="fr-CH" dirty="0" err="1"/>
               <a:t>models</a:t>
             </a:r>
             <a:endParaRPr lang="fr-CH" dirty="0"/>
           </a:p>
         </p:txBody>
       </p:sp>
-      <p:pic>
-        <p:nvPicPr>
-          <p:cNvPr id="16" name="Immagine 15">
+      <p:grpSp>
+        <p:nvGrpSpPr>
+          <p:cNvPr id="14" name="Group 13">
             <a:extLst>
               <a:ext uri="{FF2B5EF4-FFF2-40B4-BE49-F238E27FC236}">
-                <a16:creationId xmlns:a16="http://schemas.microsoft.com/office/drawing/2014/main" id="{45C42CC5-4B5D-47D4-9E11-FDAC21F609C8}"/>
+                <a16:creationId xmlns:a16="http://schemas.microsoft.com/office/drawing/2014/main" id="{ED2568D6-7FA1-4D47-BA7F-B24D0687A1FB}"/>
               </a:ext>
             </a:extLst>
           </p:cNvPr>
-          <p:cNvPicPr>
-            <a:picLocks noChangeAspect="1"/>
-          </p:cNvPicPr>
+          <p:cNvGrpSpPr/>
           <p:nvPr/>
-        </p:nvPicPr>
-        <p:blipFill>
-          <a:blip r:embed="rId3"/>
-          <a:stretch>
-            <a:fillRect/>
-          </a:stretch>
-        </p:blipFill>
-        <p:spPr>
+        </p:nvGrpSpPr>
+        <p:grpSpPr>
           <a:xfrm>
-            <a:off x="3374907" y="3766021"/>
-            <a:ext cx="3397153" cy="575139"/>
+            <a:off x="3904376" y="2200699"/>
+            <a:ext cx="3879385" cy="2800518"/>
+            <a:chOff x="3374907" y="3766021"/>
+            <a:chExt cx="3397153" cy="2452396"/>
           </a:xfrm>
-          <a:prstGeom prst="rect">
-            <a:avLst/>
-          </a:prstGeom>
-        </p:spPr>
-      </p:pic>
-      <p:pic>
-        <p:nvPicPr>
-          <p:cNvPr id="18" name="Immagine 17">
-            <a:extLst>
-              <a:ext uri="{FF2B5EF4-FFF2-40B4-BE49-F238E27FC236}">
-                <a16:creationId xmlns:a16="http://schemas.microsoft.com/office/drawing/2014/main" id="{3A31E42B-C59D-49B4-86E2-F7DE5BB7494A}"/>
-              </a:ext>
-            </a:extLst>
-          </p:cNvPr>
-          <p:cNvPicPr>
-            <a:picLocks noChangeAspect="1"/>
-          </p:cNvPicPr>
-          <p:nvPr/>
-        </p:nvPicPr>
-        <p:blipFill>
-          <a:blip r:embed="rId4"/>
-          <a:stretch>
-            <a:fillRect/>
-          </a:stretch>
-        </p:blipFill>
-        <p:spPr>
-          <a:xfrm>
-            <a:off x="3581400" y="4341160"/>
-            <a:ext cx="3337415" cy="1876369"/>
-          </a:xfrm>
-          <a:prstGeom prst="rect">
-            <a:avLst/>
-          </a:prstGeom>
-        </p:spPr>
-      </p:pic>
+        </p:grpSpPr>
+        <p:pic>
+          <p:nvPicPr>
+            <p:cNvPr id="16" name="Immagine 15">
+              <a:extLst>
+                <a:ext uri="{FF2B5EF4-FFF2-40B4-BE49-F238E27FC236}">
+                  <a16:creationId xmlns:a16="http://schemas.microsoft.com/office/drawing/2014/main" id="{45C42CC5-4B5D-47D4-9E11-FDAC21F609C8}"/>
+                </a:ext>
+              </a:extLst>
+            </p:cNvPr>
+            <p:cNvPicPr>
+              <a:picLocks noChangeAspect="1"/>
+            </p:cNvPicPr>
+            <p:nvPr/>
+          </p:nvPicPr>
+          <p:blipFill>
+            <a:blip r:embed="rId3"/>
+            <a:stretch>
+              <a:fillRect/>
+            </a:stretch>
+          </p:blipFill>
+          <p:spPr>
+            <a:xfrm>
+              <a:off x="3374907" y="3766021"/>
+              <a:ext cx="3397153" cy="575139"/>
+            </a:xfrm>
+            <a:prstGeom prst="rect">
+              <a:avLst/>
+            </a:prstGeom>
+          </p:spPr>
+        </p:pic>
+        <p:pic>
+          <p:nvPicPr>
+            <p:cNvPr id="18" name="Immagine 17">
+              <a:extLst>
+                <a:ext uri="{FF2B5EF4-FFF2-40B4-BE49-F238E27FC236}">
+                  <a16:creationId xmlns:a16="http://schemas.microsoft.com/office/drawing/2014/main" id="{3A31E42B-C59D-49B4-86E2-F7DE5BB7494A}"/>
+                </a:ext>
+              </a:extLst>
+            </p:cNvPr>
+            <p:cNvPicPr>
+              <a:picLocks noChangeAspect="1"/>
+            </p:cNvPicPr>
+            <p:nvPr/>
+          </p:nvPicPr>
+          <p:blipFill>
+            <a:blip r:embed="rId4"/>
+            <a:stretch>
+              <a:fillRect/>
+            </a:stretch>
+          </p:blipFill>
+          <p:spPr>
+            <a:xfrm>
+              <a:off x="3374907" y="4342048"/>
+              <a:ext cx="3337415" cy="1876369"/>
+            </a:xfrm>
+            <a:prstGeom prst="rect">
+              <a:avLst/>
+            </a:prstGeom>
+          </p:spPr>
+        </p:pic>
+      </p:grpSp>
     </p:spTree>
     <p:extLst>
       <p:ext uri="{BB962C8B-B14F-4D97-AF65-F5344CB8AC3E}">
@@ -24971,8 +25146,8 @@
         </p:nvSpPr>
         <p:spPr>
           <a:xfrm>
-            <a:off x="570640" y="2206935"/>
-            <a:ext cx="2901329" cy="3416320"/>
+            <a:off x="2047115" y="1949283"/>
+            <a:ext cx="8167438" cy="4524315"/>
           </a:xfrm>
           <a:prstGeom prst="rect">
             <a:avLst/>
@@ -24980,25 +25155,29 @@
           <a:noFill/>
         </p:spPr>
         <p:txBody>
-          <a:bodyPr wrap="square" rtlCol="0">
+          <a:bodyPr wrap="square" numCol="2" rtlCol="0">
             <a:spAutoFit/>
           </a:bodyPr>
           <a:lstStyle/>
           <a:p>
             <a:r>
+              <a:rPr lang="fr-CH" b="1" dirty="0"/>
+              <a:t>Location </a:t>
+            </a:r>
+            <a:r>
+              <a:rPr lang="fr-CH" b="1" dirty="0" err="1"/>
+              <a:t>prediction</a:t>
+            </a:r>
+            <a:endParaRPr lang="fr-CH" b="1" dirty="0"/>
+          </a:p>
+          <a:p>
+            <a:pPr marL="285750" indent="-285750">
+              <a:buFont typeface="Arial" panose="020B0604020202020204" pitchFamily="34" charset="0"/>
+              <a:buChar char="•"/>
+            </a:pPr>
+            <a:r>
               <a:rPr lang="fr-CH" dirty="0"/>
-              <a:t>Location </a:t>
-            </a:r>
-            <a:r>
-              <a:rPr lang="fr-CH" dirty="0" err="1"/>
-              <a:t>prediction</a:t>
-            </a:r>
-            <a:endParaRPr lang="fr-CH" dirty="0"/>
-          </a:p>
-          <a:p>
-            <a:r>
-              <a:rPr lang="fr-CH" dirty="0"/>
-              <a:t>All </a:t>
+              <a:t>All 7 </a:t>
             </a:r>
             <a:r>
               <a:rPr lang="fr-CH" dirty="0" err="1"/>
@@ -25015,9 +25194,17 @@
             <a:endParaRPr lang="fr-CH" dirty="0"/>
           </a:p>
           <a:p>
+            <a:pPr marL="285750" indent="-285750">
+              <a:buFont typeface="Arial" panose="020B0604020202020204" pitchFamily="34" charset="0"/>
+              <a:buChar char="•"/>
+            </a:pPr>
             <a:endParaRPr lang="fr-CH" dirty="0"/>
           </a:p>
           <a:p>
+            <a:pPr marL="285750" indent="-285750">
+              <a:buFont typeface="Arial" panose="020B0604020202020204" pitchFamily="34" charset="0"/>
+              <a:buChar char="•"/>
+            </a:pPr>
             <a:r>
               <a:rPr lang="fr-CH" dirty="0" err="1"/>
               <a:t>Binary</a:t>
@@ -25033,49 +25220,124 @@
             <a:endParaRPr lang="fr-CH" dirty="0"/>
           </a:p>
           <a:p>
+            <a:pPr marL="742950" lvl="1" indent="-285750">
+              <a:buFont typeface="Arial" panose="020B0604020202020204" pitchFamily="34" charset="0"/>
+              <a:buChar char="•"/>
+            </a:pPr>
+            <a:r>
+              <a:rPr lang="fr-CH" dirty="0" err="1"/>
+              <a:t>Anterior</a:t>
+            </a:r>
+            <a:r>
+              <a:rPr lang="fr-CH" dirty="0"/>
+              <a:t> &amp; </a:t>
+            </a:r>
+            <a:r>
+              <a:rPr lang="fr-CH" dirty="0" err="1"/>
+              <a:t>Posterior</a:t>
+            </a:r>
+            <a:endParaRPr lang="fr-CH" dirty="0"/>
+          </a:p>
+          <a:p>
+            <a:pPr marL="285750" indent="-285750">
+              <a:buFont typeface="Arial" panose="020B0604020202020204" pitchFamily="34" charset="0"/>
+              <a:buChar char="•"/>
+            </a:pPr>
+            <a:r>
+              <a:rPr lang="fr-CH" dirty="0"/>
+              <a:t>Macro-F1 0.49 </a:t>
+            </a:r>
+            <a:br>
+              <a:rPr lang="fr-CH" dirty="0"/>
+            </a:br>
+            <a:r>
+              <a:rPr lang="fr-CH" dirty="0" err="1"/>
+              <a:t>expected</a:t>
+            </a:r>
+            <a:r>
+              <a:rPr lang="fr-CH" dirty="0"/>
+              <a:t> 0.5</a:t>
+            </a:r>
+          </a:p>
+          <a:p>
+            <a:endParaRPr lang="fr-CH" dirty="0"/>
+          </a:p>
+          <a:p>
+            <a:pPr marL="285750" indent="-285750">
+              <a:buFont typeface="Arial" panose="020B0604020202020204" pitchFamily="34" charset="0"/>
+              <a:buChar char="•"/>
+            </a:pPr>
+            <a:r>
+              <a:rPr lang="fr-CH" dirty="0" err="1"/>
+              <a:t>Multiclass</a:t>
+            </a:r>
             <a:r>
               <a:rPr lang="fr-CH" dirty="0"/>
               <a:t> </a:t>
             </a:r>
             <a:r>
               <a:rPr lang="fr-CH" dirty="0" err="1"/>
-              <a:t>anterior</a:t>
-            </a:r>
+              <a:t>approach</a:t>
+            </a:r>
+            <a:endParaRPr lang="fr-CH" dirty="0"/>
+          </a:p>
+          <a:p>
+            <a:pPr marL="742950" lvl="1" indent="-285750">
+              <a:buFont typeface="Arial" panose="020B0604020202020204" pitchFamily="34" charset="0"/>
+              <a:buChar char="•"/>
+            </a:pPr>
             <a:r>
               <a:rPr lang="fr-CH" dirty="0"/>
-              <a:t>/</a:t>
-            </a:r>
-            <a:r>
-              <a:rPr lang="fr-CH" dirty="0" err="1"/>
-              <a:t>posterior</a:t>
-            </a:r>
-            <a:endParaRPr lang="fr-CH" dirty="0"/>
-          </a:p>
-          <a:p>
-            <a:r>
-              <a:rPr lang="fr-CH" dirty="0" err="1"/>
-              <a:t>Results</a:t>
-            </a:r>
+              <a:t>Four classes</a:t>
+            </a:r>
+          </a:p>
+          <a:p>
+            <a:pPr marL="285750" indent="-285750">
+              <a:buFont typeface="Arial" panose="020B0604020202020204" pitchFamily="34" charset="0"/>
+              <a:buChar char="•"/>
+            </a:pPr>
             <a:r>
               <a:rPr lang="fr-CH" dirty="0"/>
-              <a:t> Macro-F1 0,49, </a:t>
-            </a:r>
+              <a:t>Macro-F1 0.24 </a:t>
+            </a:r>
+            <a:br>
+              <a:rPr lang="fr-CH" dirty="0"/>
+            </a:br>
             <a:r>
               <a:rPr lang="fr-CH" dirty="0" err="1"/>
               <a:t>expected</a:t>
             </a:r>
             <a:r>
               <a:rPr lang="fr-CH" dirty="0"/>
-              <a:t> 0,5</a:t>
+              <a:t> 0.25</a:t>
             </a:r>
           </a:p>
           <a:p>
             <a:endParaRPr lang="fr-CH" dirty="0"/>
           </a:p>
           <a:p>
+            <a:pPr marL="285750" indent="-285750">
+              <a:buFont typeface="Arial" panose="020B0604020202020204" pitchFamily="34" charset="0"/>
+              <a:buChar char="•"/>
+            </a:pPr>
+            <a:r>
+              <a:rPr lang="fr-CH" dirty="0"/>
+              <a:t>One vs. All </a:t>
+            </a:r>
             <a:r>
               <a:rPr lang="fr-CH" dirty="0" err="1"/>
-              <a:t>Multiclass</a:t>
+              <a:t>approach</a:t>
+            </a:r>
+            <a:endParaRPr lang="fr-CH" dirty="0"/>
+          </a:p>
+          <a:p>
+            <a:pPr marL="285750" indent="-285750">
+              <a:buFont typeface="Arial" panose="020B0604020202020204" pitchFamily="34" charset="0"/>
+              <a:buChar char="•"/>
+            </a:pPr>
+            <a:r>
+              <a:rPr lang="fr-CH" dirty="0" err="1"/>
+              <a:t>Extract</a:t>
             </a:r>
             <a:r>
               <a:rPr lang="fr-CH" dirty="0"/>
@@ -25083,116 +25345,116 @@
             </a:r>
             <a:r>
               <a:rPr lang="fr-CH" dirty="0" err="1"/>
-              <a:t>approach</a:t>
+              <a:t>feature</a:t>
+            </a:r>
+            <a:r>
+              <a:rPr lang="fr-CH" dirty="0"/>
+              <a:t> importance</a:t>
+            </a:r>
+          </a:p>
+          <a:p>
+            <a:pPr marL="285750" indent="-285750">
+              <a:buFont typeface="Arial" panose="020B0604020202020204" pitchFamily="34" charset="0"/>
+              <a:buChar char="•"/>
+            </a:pPr>
+            <a:r>
+              <a:rPr lang="fr-CH" dirty="0" err="1"/>
+              <a:t>XGBoost</a:t>
             </a:r>
             <a:endParaRPr lang="fr-CH" dirty="0"/>
           </a:p>
           <a:p>
             <a:r>
+              <a:rPr lang="fr-CH" b="1" dirty="0" err="1"/>
+              <a:t>Category</a:t>
+            </a:r>
+            <a:r>
+              <a:rPr lang="fr-CH" b="1" dirty="0"/>
+              <a:t> </a:t>
+            </a:r>
+            <a:r>
+              <a:rPr lang="fr-CH" b="1" dirty="0" err="1"/>
+              <a:t>prediction</a:t>
+            </a:r>
+            <a:endParaRPr lang="fr-CH" dirty="0"/>
+          </a:p>
+          <a:p>
+            <a:pPr marL="285750" indent="-285750">
+              <a:buFont typeface="Arial" panose="020B0604020202020204" pitchFamily="34" charset="0"/>
+              <a:buChar char="•"/>
+            </a:pPr>
+            <a:r>
+              <a:rPr lang="fr-CH" dirty="0" err="1"/>
+              <a:t>Decision</a:t>
+            </a:r>
+            <a:r>
               <a:rPr lang="fr-CH" dirty="0"/>
-              <a:t> Four classes</a:t>
-            </a:r>
-          </a:p>
-          <a:p>
+              <a:t> </a:t>
+            </a:r>
             <a:r>
               <a:rPr lang="fr-CH" dirty="0" err="1"/>
-              <a:t>Results</a:t>
-            </a:r>
+              <a:t>Tree</a:t>
+            </a:r>
+            <a:endParaRPr lang="fr-CH" dirty="0"/>
+          </a:p>
+          <a:p>
+            <a:endParaRPr lang="fr-CH" dirty="0"/>
+          </a:p>
+          <a:p>
+            <a:pPr marL="285750" indent="-285750">
+              <a:buFont typeface="Arial" panose="020B0604020202020204" pitchFamily="34" charset="0"/>
+              <a:buChar char="•"/>
+            </a:pPr>
             <a:r>
               <a:rPr lang="fr-CH" dirty="0"/>
-              <a:t> Macro-F1 0,24, </a:t>
-            </a:r>
+              <a:t>Macro-F1 0.24</a:t>
+            </a:r>
+            <a:br>
+              <a:rPr lang="fr-CH" dirty="0"/>
+            </a:br>
             <a:r>
               <a:rPr lang="fr-CH" dirty="0" err="1"/>
               <a:t>expected</a:t>
             </a:r>
             <a:r>
               <a:rPr lang="fr-CH" dirty="0"/>
-              <a:t> 0,25</a:t>
-            </a:r>
-          </a:p>
-        </p:txBody>
-      </p:sp>
-      <p:sp>
-        <p:nvSpPr>
-          <p:cNvPr id="32" name="CasellaDiTesto 31">
-            <a:extLst>
-              <a:ext uri="{FF2B5EF4-FFF2-40B4-BE49-F238E27FC236}">
-                <a16:creationId xmlns:a16="http://schemas.microsoft.com/office/drawing/2014/main" id="{6E7EAE73-7513-4028-B13B-386A8C4701D4}"/>
-              </a:ext>
-            </a:extLst>
-          </p:cNvPr>
-          <p:cNvSpPr txBox="1"/>
-          <p:nvPr/>
-        </p:nvSpPr>
-        <p:spPr>
-          <a:xfrm>
-            <a:off x="6822157" y="2206935"/>
-            <a:ext cx="2261936" cy="923330"/>
-          </a:xfrm>
-          <a:prstGeom prst="rect">
-            <a:avLst/>
-          </a:prstGeom>
-          <a:noFill/>
-        </p:spPr>
-        <p:txBody>
-          <a:bodyPr wrap="square" rtlCol="0">
-            <a:spAutoFit/>
-          </a:bodyPr>
-          <a:lstStyle/>
-          <a:p>
+              <a:t> </a:t>
+            </a:r>
+          </a:p>
+          <a:p>
+            <a:pPr marL="285750" indent="-285750">
+              <a:buFont typeface="Arial" panose="020B0604020202020204" pitchFamily="34" charset="0"/>
+              <a:buChar char="•"/>
+            </a:pPr>
+            <a:endParaRPr lang="fr-CH" dirty="0"/>
+          </a:p>
+          <a:p>
+            <a:r>
+              <a:rPr lang="fr-CH" b="1" dirty="0" err="1"/>
+              <a:t>Specific</a:t>
+            </a:r>
+            <a:r>
+              <a:rPr lang="fr-CH" b="1" dirty="0"/>
+              <a:t> </a:t>
+            </a:r>
+            <a:r>
+              <a:rPr lang="fr-CH" b="1" dirty="0" err="1"/>
+              <a:t>Diagnosis</a:t>
+            </a:r>
+            <a:endParaRPr lang="fr-CH" b="1" dirty="0"/>
+          </a:p>
+          <a:p>
+            <a:pPr marL="285750" indent="-285750">
+              <a:buFont typeface="Arial" panose="020B0604020202020204" pitchFamily="34" charset="0"/>
+              <a:buChar char="•"/>
+            </a:pPr>
+            <a:r>
+              <a:rPr lang="fr-CH" dirty="0"/>
+              <a:t>All 7 </a:t>
+            </a:r>
             <a:r>
               <a:rPr lang="fr-CH" dirty="0" err="1"/>
-              <a:t>Category</a:t>
-            </a:r>
-            <a:endParaRPr lang="fr-CH" dirty="0"/>
-          </a:p>
-          <a:p>
-            <a:endParaRPr lang="fr-CH" dirty="0"/>
-          </a:p>
-          <a:p>
-            <a:r>
-              <a:rPr lang="fr-CH" dirty="0" err="1"/>
-              <a:t>Results</a:t>
-            </a:r>
-            <a:r>
-              <a:rPr lang="fr-CH" dirty="0"/>
-              <a:t> Macro-F1 0,24</a:t>
-            </a:r>
-          </a:p>
-        </p:txBody>
-      </p:sp>
-      <p:sp>
-        <p:nvSpPr>
-          <p:cNvPr id="33" name="CasellaDiTesto 32">
-            <a:extLst>
-              <a:ext uri="{FF2B5EF4-FFF2-40B4-BE49-F238E27FC236}">
-                <a16:creationId xmlns:a16="http://schemas.microsoft.com/office/drawing/2014/main" id="{265BC6E1-6FAE-4194-AC51-8B961B6B033B}"/>
-              </a:ext>
-            </a:extLst>
-          </p:cNvPr>
-          <p:cNvSpPr txBox="1"/>
-          <p:nvPr/>
-        </p:nvSpPr>
-        <p:spPr>
-          <a:xfrm>
-            <a:off x="9106198" y="2234041"/>
-            <a:ext cx="2811943" cy="2862322"/>
-          </a:xfrm>
-          <a:prstGeom prst="rect">
-            <a:avLst/>
-          </a:prstGeom>
-          <a:noFill/>
-        </p:spPr>
-        <p:txBody>
-          <a:bodyPr wrap="square" rtlCol="0">
-            <a:spAutoFit/>
-          </a:bodyPr>
-          <a:lstStyle/>
-          <a:p>
-            <a:r>
-              <a:rPr lang="fr-CH" dirty="0" err="1"/>
-              <a:t>Specific</a:t>
+              <a:t>algorithms</a:t>
             </a:r>
             <a:r>
               <a:rPr lang="fr-CH" dirty="0"/>
@@ -25200,7 +25462,7 @@
             </a:r>
             <a:r>
               <a:rPr lang="fr-CH" dirty="0" err="1"/>
-              <a:t>Diagnosis</a:t>
+              <a:t>tested</a:t>
             </a:r>
             <a:endParaRPr lang="fr-CH" dirty="0"/>
           </a:p>
@@ -25208,13 +25470,13 @@
             <a:endParaRPr lang="fr-CH" dirty="0"/>
           </a:p>
           <a:p>
-            <a:r>
-              <a:rPr lang="fr-CH" dirty="0"/>
-              <a:t>High </a:t>
-            </a:r>
+            <a:pPr marL="285750" indent="-285750">
+              <a:buFont typeface="Arial" panose="020B0604020202020204" pitchFamily="34" charset="0"/>
+              <a:buChar char="•"/>
+            </a:pPr>
             <a:r>
               <a:rPr lang="fr-CH" dirty="0" err="1"/>
-              <a:t>target</a:t>
+              <a:t>Idiopathic</a:t>
             </a:r>
             <a:r>
               <a:rPr lang="fr-CH" dirty="0"/>
@@ -25222,14 +25484,22 @@
             </a:r>
             <a:r>
               <a:rPr lang="fr-CH" dirty="0" err="1"/>
-              <a:t>number</a:t>
+              <a:t>undersampling</a:t>
             </a:r>
             <a:endParaRPr lang="fr-CH" dirty="0"/>
           </a:p>
           <a:p>
+            <a:pPr marL="285750" indent="-285750">
+              <a:buFont typeface="Arial" panose="020B0604020202020204" pitchFamily="34" charset="0"/>
+              <a:buChar char="•"/>
+            </a:pPr>
+            <a:r>
+              <a:rPr lang="fr-CH" dirty="0"/>
+              <a:t>And </a:t>
+            </a:r>
             <a:r>
               <a:rPr lang="fr-CH" dirty="0" err="1"/>
-              <a:t>Idiopathic</a:t>
+              <a:t>other</a:t>
             </a:r>
             <a:r>
               <a:rPr lang="fr-CH" dirty="0"/>
@@ -25237,49 +25507,42 @@
             </a:r>
             <a:r>
               <a:rPr lang="fr-CH" dirty="0" err="1"/>
-              <a:t>undersampling</a:t>
+              <a:t>steps</a:t>
             </a:r>
             <a:endParaRPr lang="fr-CH" dirty="0"/>
           </a:p>
           <a:p>
-            <a:r>
-              <a:rPr lang="fr-CH" dirty="0"/>
-              <a:t>And </a:t>
-            </a:r>
-            <a:r>
-              <a:rPr lang="fr-CH" dirty="0" err="1"/>
-              <a:t>other</a:t>
-            </a:r>
-            <a:r>
-              <a:rPr lang="fr-CH" dirty="0"/>
-              <a:t> </a:t>
-            </a:r>
-            <a:r>
-              <a:rPr lang="fr-CH" dirty="0" err="1"/>
-              <a:t>steps</a:t>
-            </a:r>
-            <a:endParaRPr lang="fr-CH" dirty="0"/>
-          </a:p>
-          <a:p>
-            <a:endParaRPr lang="fr-CH" dirty="0"/>
-          </a:p>
-          <a:p>
+            <a:pPr marL="285750" indent="-285750">
+              <a:buFont typeface="Arial" panose="020B0604020202020204" pitchFamily="34" charset="0"/>
+              <a:buChar char="•"/>
+            </a:pPr>
             <a:r>
               <a:rPr lang="fr-CH" dirty="0"/>
               <a:t>27 to 12 classes</a:t>
             </a:r>
           </a:p>
           <a:p>
+            <a:pPr marL="285750" indent="-285750">
+              <a:buFont typeface="Arial" panose="020B0604020202020204" pitchFamily="34" charset="0"/>
+              <a:buChar char="•"/>
+            </a:pPr>
             <a:endParaRPr lang="fr-CH" dirty="0"/>
           </a:p>
           <a:p>
-            <a:r>
-              <a:rPr lang="fr-CH" dirty="0" err="1"/>
-              <a:t>Results</a:t>
-            </a:r>
+            <a:pPr marL="285750" indent="-285750">
+              <a:buFont typeface="Arial" panose="020B0604020202020204" pitchFamily="34" charset="0"/>
+              <a:buChar char="•"/>
+            </a:pPr>
             <a:r>
               <a:rPr lang="fr-CH" dirty="0"/>
-              <a:t> Macro-F1 0,07, 0,083 </a:t>
+              <a:t>Macro-F1 0.07</a:t>
+            </a:r>
+            <a:br>
+              <a:rPr lang="fr-CH" dirty="0"/>
+            </a:br>
+            <a:r>
+              <a:rPr lang="fr-CH" dirty="0"/>
+              <a:t> 0.083 </a:t>
             </a:r>
             <a:r>
               <a:rPr lang="fr-CH" dirty="0" err="1"/>
@@ -25287,69 +25550,11 @@
             </a:r>
             <a:endParaRPr lang="fr-CH" dirty="0"/>
           </a:p>
-        </p:txBody>
-      </p:sp>
-      <p:sp>
-        <p:nvSpPr>
-          <p:cNvPr id="34" name="CasellaDiTesto 33">
-            <a:extLst>
-              <a:ext uri="{FF2B5EF4-FFF2-40B4-BE49-F238E27FC236}">
-                <a16:creationId xmlns:a16="http://schemas.microsoft.com/office/drawing/2014/main" id="{41042B96-F941-4CE5-9794-4D633B0209F8}"/>
-              </a:ext>
-            </a:extLst>
-          </p:cNvPr>
-          <p:cNvSpPr txBox="1"/>
-          <p:nvPr/>
-        </p:nvSpPr>
-        <p:spPr>
-          <a:xfrm>
-            <a:off x="3471969" y="2206935"/>
-            <a:ext cx="2901329" cy="923330"/>
-          </a:xfrm>
-          <a:prstGeom prst="rect">
-            <a:avLst/>
-          </a:prstGeom>
-          <a:noFill/>
-        </p:spPr>
-        <p:txBody>
-          <a:bodyPr wrap="square" rtlCol="0">
-            <a:spAutoFit/>
-          </a:bodyPr>
-          <a:lstStyle/>
-          <a:p>
-            <a:r>
-              <a:rPr lang="fr-CH" dirty="0"/>
-              <a:t>One vs. All </a:t>
-            </a:r>
-            <a:r>
-              <a:rPr lang="fr-CH" dirty="0" err="1"/>
-              <a:t>approach</a:t>
-            </a:r>
-            <a:endParaRPr lang="fr-CH" dirty="0"/>
-          </a:p>
-          <a:p>
-            <a:r>
-              <a:rPr lang="fr-CH" dirty="0" err="1"/>
-              <a:t>Extract</a:t>
-            </a:r>
-            <a:r>
-              <a:rPr lang="fr-CH" dirty="0"/>
-              <a:t> </a:t>
-            </a:r>
-            <a:r>
-              <a:rPr lang="fr-CH" dirty="0" err="1"/>
-              <a:t>feature</a:t>
-            </a:r>
-            <a:r>
-              <a:rPr lang="fr-CH" dirty="0"/>
-              <a:t> importance</a:t>
-            </a:r>
-          </a:p>
-          <a:p>
-            <a:r>
-              <a:rPr lang="fr-CH" dirty="0" err="1"/>
-              <a:t>XGBoost</a:t>
-            </a:r>
+          <a:p>
+            <a:pPr marL="285750" indent="-285750">
+              <a:buFont typeface="Arial" panose="020B0604020202020204" pitchFamily="34" charset="0"/>
+              <a:buChar char="•"/>
+            </a:pPr>
             <a:endParaRPr lang="fr-CH" dirty="0"/>
           </a:p>
         </p:txBody>

</xml_diff>